<commit_message>
Added Dockerization to the project.
</commit_message>
<xml_diff>
--- a/Presentation.pptx
+++ b/Presentation.pptx
@@ -4600,6 +4600,18 @@
             <a:pPr lvl="1"/>
             <a:r>
               <a:rPr lang="en-US" b="1" dirty="0"/>
+              <a:t>Explained Variance of the </a:t>
+            </a:r>
+            <a:r>
+              <a:rPr lang="en-US" b="1"/>
+              <a:t>2D data: 44.6 %</a:t>
+            </a:r>
+            <a:endParaRPr lang="en-US" b="1" dirty="0"/>
+          </a:p>
+          <a:p>
+            <a:pPr lvl="1"/>
+            <a:r>
+              <a:rPr lang="en-US" b="1" dirty="0"/>
               <a:t>Justifications for PCA:</a:t>
             </a:r>
           </a:p>

</xml_diff>